<commit_message>
tcmb and electricity added
</commit_message>
<xml_diff>
--- a/Murat Ertan 401 003 P2 Spring 2022 2023.pptx
+++ b/Murat Ertan 401 003 P2 Spring 2022 2023.pptx
@@ -27205,7 +27205,7 @@
                 <a:ea typeface="Calibri" panose="020F0502020204030204" pitchFamily="34" charset="0"/>
                 <a:cs typeface="Times New Roman" panose="02020603050405020304" pitchFamily="18" charset="0"/>
               </a:rPr>
-              <a:t>ROSA [17]</a:t>
+              <a:t>ROSA [17], [30], [31]</a:t>
             </a:r>
             <a:endParaRPr lang="en-GB" sz="1800" dirty="0">
               <a:effectLst/>
@@ -37922,22 +37922,196 @@
                 <a:effectLst/>
                 <a:ea typeface="Calibri" panose="020F0502020204030204" pitchFamily="34" charset="0"/>
               </a:rPr>
-              <a:t> [30] “Mechanical Engineers,” U.S. Bureau of </a:t>
+              <a:t> [30] “Mechanical Engineers,” </a:t>
+            </a:r>
+            <a:r>
+              <a:rPr lang="en-GB" sz="1600" i="1" dirty="0">
+                <a:effectLst/>
+                <a:ea typeface="Calibri" panose="020F0502020204030204" pitchFamily="34" charset="0"/>
+              </a:rPr>
+              <a:t>U.S. Bureau of </a:t>
+            </a:r>
+            <a:r>
+              <a:rPr lang="en-GB" sz="1600" i="1" dirty="0" err="1">
+                <a:effectLst/>
+                <a:ea typeface="Calibri" panose="020F0502020204030204" pitchFamily="34" charset="0"/>
+              </a:rPr>
+              <a:t>Labor</a:t>
+            </a:r>
+            <a:r>
+              <a:rPr lang="en-GB" sz="1600" i="1" dirty="0">
+                <a:effectLst/>
+                <a:ea typeface="Calibri" panose="020F0502020204030204" pitchFamily="34" charset="0"/>
+              </a:rPr>
+              <a:t> Statistics</a:t>
+            </a:r>
+            <a:r>
+              <a:rPr lang="en-GB" sz="1600" dirty="0">
+                <a:effectLst/>
+                <a:ea typeface="Calibri" panose="020F0502020204030204" pitchFamily="34" charset="0"/>
+              </a:rPr>
+              <a:t>. [Online]. Available: https://www.bls.gov/ooh/architecture-and-engineering/mechanical-engineers.htm [Accessed: Mar. 23, 2023].</a:t>
+            </a:r>
+          </a:p>
+          <a:p>
+            <a:pPr marL="540000" indent="-457200">
+              <a:lnSpc>
+                <a:spcPct val="150000"/>
+              </a:lnSpc>
+              <a:spcAft>
+                <a:spcPts val="800"/>
+              </a:spcAft>
+            </a:pPr>
+            <a:r>
+              <a:rPr lang="en-GB" sz="1600" dirty="0">
+                <a:effectLst/>
+                <a:ea typeface="Calibri" panose="020F0502020204030204" pitchFamily="34" charset="0"/>
+              </a:rPr>
+              <a:t> [31] “</a:t>
             </a:r>
             <a:r>
               <a:rPr lang="en-GB" sz="1600" dirty="0" err="1">
                 <a:effectLst/>
                 <a:ea typeface="Calibri" panose="020F0502020204030204" pitchFamily="34" charset="0"/>
               </a:rPr>
-              <a:t>Labor</a:t>
+              <a:t>Gösterge</a:t>
             </a:r>
             <a:r>
               <a:rPr lang="en-GB" sz="1600" dirty="0">
                 <a:effectLst/>
                 <a:ea typeface="Calibri" panose="020F0502020204030204" pitchFamily="34" charset="0"/>
               </a:rPr>
-              <a:t> Statistics. [Online]. Available: https://www.bls.gov/ooh/architecture-and-engineering/mechanical-engineers.htm [Accessed: Mar. 23, 2023].</a:t>
-            </a:r>
+              <a:t> </a:t>
+            </a:r>
+            <a:r>
+              <a:rPr lang="en-GB" sz="1600" dirty="0" err="1">
+                <a:effectLst/>
+                <a:ea typeface="Calibri" panose="020F0502020204030204" pitchFamily="34" charset="0"/>
+              </a:rPr>
+              <a:t>Niteliğindeki</a:t>
+            </a:r>
+            <a:r>
+              <a:rPr lang="en-GB" sz="1600" dirty="0">
+                <a:effectLst/>
+                <a:ea typeface="Calibri" panose="020F0502020204030204" pitchFamily="34" charset="0"/>
+              </a:rPr>
+              <a:t> Merkez </a:t>
+            </a:r>
+            <a:r>
+              <a:rPr lang="en-GB" sz="1600" dirty="0" err="1">
+                <a:effectLst/>
+                <a:ea typeface="Calibri" panose="020F0502020204030204" pitchFamily="34" charset="0"/>
+              </a:rPr>
+              <a:t>Bankası</a:t>
+            </a:r>
+            <a:r>
+              <a:rPr lang="en-GB" sz="1600" dirty="0">
+                <a:effectLst/>
+                <a:ea typeface="Calibri" panose="020F0502020204030204" pitchFamily="34" charset="0"/>
+              </a:rPr>
+              <a:t> </a:t>
+            </a:r>
+            <a:r>
+              <a:rPr lang="en-GB" sz="1600" dirty="0" err="1">
+                <a:effectLst/>
+                <a:ea typeface="Calibri" panose="020F0502020204030204" pitchFamily="34" charset="0"/>
+              </a:rPr>
+              <a:t>Kurları</a:t>
+            </a:r>
+            <a:r>
+              <a:rPr lang="en-GB" sz="1600" dirty="0">
+                <a:effectLst/>
+                <a:ea typeface="Calibri" panose="020F0502020204030204" pitchFamily="34" charset="0"/>
+              </a:rPr>
+              <a:t>,” </a:t>
+            </a:r>
+            <a:r>
+              <a:rPr lang="en-GB" sz="1600" i="1" dirty="0">
+                <a:effectLst/>
+                <a:ea typeface="Calibri" panose="020F0502020204030204" pitchFamily="34" charset="0"/>
+              </a:rPr>
+              <a:t>TCMB</a:t>
+            </a:r>
+            <a:r>
+              <a:rPr lang="en-GB" sz="1600" dirty="0">
+                <a:effectLst/>
+                <a:ea typeface="Calibri" panose="020F0502020204030204" pitchFamily="34" charset="0"/>
+              </a:rPr>
+              <a:t>. [Online]. Available: https://www.tcmb.gov.tr/kurlar/kurlar_tr.html https://www.bls.gov/ooh/architecture-and-engineering/mechanical-engineers.html. [Accessed: Mar. 23, 2023].</a:t>
+            </a:r>
+          </a:p>
+          <a:p>
+            <a:pPr marL="540000" indent="-457200">
+              <a:lnSpc>
+                <a:spcPct val="150000"/>
+              </a:lnSpc>
+              <a:spcAft>
+                <a:spcPts val="800"/>
+              </a:spcAft>
+            </a:pPr>
+            <a:r>
+              <a:rPr lang="en-GB" sz="1600" dirty="0">
+                <a:effectLst/>
+                <a:ea typeface="Calibri" panose="020F0502020204030204" pitchFamily="34" charset="0"/>
+              </a:rPr>
+              <a:t> [32] “1 kWh </a:t>
+            </a:r>
+            <a:r>
+              <a:rPr lang="en-GB" sz="1600" dirty="0" err="1">
+                <a:effectLst/>
+                <a:ea typeface="Calibri" panose="020F0502020204030204" pitchFamily="34" charset="0"/>
+              </a:rPr>
+              <a:t>Elektrik</a:t>
+            </a:r>
+            <a:r>
+              <a:rPr lang="en-GB" sz="1600" dirty="0">
+                <a:effectLst/>
+                <a:ea typeface="Calibri" panose="020F0502020204030204" pitchFamily="34" charset="0"/>
+              </a:rPr>
+              <a:t> kaç TL ?,” </a:t>
+            </a:r>
+            <a:r>
+              <a:rPr lang="en-GB" sz="1600" i="1" dirty="0" err="1">
+                <a:ea typeface="Calibri" panose="020F0502020204030204" pitchFamily="34" charset="0"/>
+              </a:rPr>
+              <a:t>GazElektrik</a:t>
+            </a:r>
+            <a:r>
+              <a:rPr lang="en-GB" sz="1600" dirty="0">
+                <a:effectLst/>
+                <a:ea typeface="Calibri" panose="020F0502020204030204" pitchFamily="34" charset="0"/>
+              </a:rPr>
+              <a:t>. [Online]. Available: </a:t>
+            </a:r>
+            <a:r>
+              <a:rPr lang="en-GB" sz="1600" dirty="0">
+                <a:effectLst/>
+                <a:ea typeface="Calibri" panose="020F0502020204030204" pitchFamily="34" charset="0"/>
+                <a:hlinkClick r:id="rId2"/>
+              </a:rPr>
+              <a:t>https://gazelektrik.com/faydali-bilgiler/1-kwh-elektrik-kac-tl</a:t>
+            </a:r>
+            <a:r>
+              <a:rPr lang="en-GB" sz="1600" dirty="0">
+                <a:effectLst/>
+                <a:ea typeface="Calibri" panose="020F0502020204030204" pitchFamily="34" charset="0"/>
+              </a:rPr>
+              <a:t>. [Accessed: Mar. 23, 2023].</a:t>
+            </a:r>
+          </a:p>
+          <a:p>
+            <a:pPr marL="540000" indent="-457200">
+              <a:lnSpc>
+                <a:spcPct val="150000"/>
+              </a:lnSpc>
+              <a:spcAft>
+                <a:spcPts val="800"/>
+              </a:spcAft>
+            </a:pPr>
+            <a:endParaRPr lang="en-GB" sz="1600" dirty="0">
+              <a:effectLst/>
+              <a:ea typeface="Calibri" panose="020F0502020204030204" pitchFamily="34" charset="0"/>
+            </a:endParaRPr>
           </a:p>
           <a:p>
             <a:pPr marL="540000" indent="-457200">

</xml_diff>